<commit_message>
slight improvements to pp
</commit_message>
<xml_diff>
--- a/Scam Trainer Web App for Older Generation.pptx
+++ b/Scam Trainer Web App for Older Generation.pptx
@@ -6,11 +6,11 @@
   </p:sldMasterIdLst>
   <p:sldIdLst>
     <p:sldId id="256" r:id="rId2"/>
-    <p:sldId id="257" r:id="rId3"/>
-    <p:sldId id="258" r:id="rId4"/>
-    <p:sldId id="259" r:id="rId5"/>
-    <p:sldId id="260" r:id="rId6"/>
-    <p:sldId id="261" r:id="rId7"/>
+    <p:sldId id="261" r:id="rId3"/>
+    <p:sldId id="257" r:id="rId4"/>
+    <p:sldId id="258" r:id="rId5"/>
+    <p:sldId id="259" r:id="rId6"/>
+    <p:sldId id="260" r:id="rId7"/>
     <p:sldId id="262" r:id="rId8"/>
   </p:sldIdLst>
   <p:sldSz cx="12192000" cy="6858000"/>
@@ -110,6 +110,11 @@
       </a:defRPr>
     </a:lvl9pPr>
   </p:defaultTextStyle>
+  <p:extLst>
+    <p:ext uri="{EFAFB233-063F-42B5-8137-9DF3F51BA10A}">
+      <p15:sldGuideLst xmlns:p15="http://schemas.microsoft.com/office/powerpoint/2012/main"/>
+    </p:ext>
+  </p:extLst>
 </p:presentation>
 </file>
 
@@ -858,7 +863,7 @@
           <a:p>
             <a:fld id="{0C89B91E-DD4E-4589-B9A0-BBCC79F14B9B}" type="datetimeFigureOut">
               <a:rPr lang="en-US" smtClean="0"/>
-              <a:t>12/2/2019</a:t>
+              <a:t>12/3/2019</a:t>
             </a:fld>
             <a:endParaRPr lang="en-US"/>
           </a:p>
@@ -1109,7 +1114,7 @@
           <a:p>
             <a:fld id="{0C89B91E-DD4E-4589-B9A0-BBCC79F14B9B}" type="datetimeFigureOut">
               <a:rPr lang="en-US" smtClean="0"/>
-              <a:t>12/2/2019</a:t>
+              <a:t>12/3/2019</a:t>
             </a:fld>
             <a:endParaRPr lang="en-US"/>
           </a:p>
@@ -1423,7 +1428,7 @@
           <a:p>
             <a:fld id="{0C89B91E-DD4E-4589-B9A0-BBCC79F14B9B}" type="datetimeFigureOut">
               <a:rPr lang="en-US" smtClean="0"/>
-              <a:t>12/2/2019</a:t>
+              <a:t>12/3/2019</a:t>
             </a:fld>
             <a:endParaRPr lang="en-US"/>
           </a:p>
@@ -1756,7 +1761,7 @@
           <a:p>
             <a:fld id="{0C89B91E-DD4E-4589-B9A0-BBCC79F14B9B}" type="datetimeFigureOut">
               <a:rPr lang="en-US" smtClean="0"/>
-              <a:t>12/2/2019</a:t>
+              <a:t>12/3/2019</a:t>
             </a:fld>
             <a:endParaRPr lang="en-US"/>
           </a:p>
@@ -2070,7 +2075,7 @@
           <a:p>
             <a:fld id="{0C89B91E-DD4E-4589-B9A0-BBCC79F14B9B}" type="datetimeFigureOut">
               <a:rPr lang="en-US" smtClean="0"/>
-              <a:t>12/2/2019</a:t>
+              <a:t>12/3/2019</a:t>
             </a:fld>
             <a:endParaRPr lang="en-US"/>
           </a:p>
@@ -2463,7 +2468,7 @@
           <a:p>
             <a:fld id="{0C89B91E-DD4E-4589-B9A0-BBCC79F14B9B}" type="datetimeFigureOut">
               <a:rPr lang="en-US" smtClean="0"/>
-              <a:t>12/2/2019</a:t>
+              <a:t>12/3/2019</a:t>
             </a:fld>
             <a:endParaRPr lang="en-US"/>
           </a:p>
@@ -2633,7 +2638,7 @@
           <a:p>
             <a:fld id="{0C89B91E-DD4E-4589-B9A0-BBCC79F14B9B}" type="datetimeFigureOut">
               <a:rPr lang="en-US" smtClean="0"/>
-              <a:t>12/2/2019</a:t>
+              <a:t>12/3/2019</a:t>
             </a:fld>
             <a:endParaRPr lang="en-US"/>
           </a:p>
@@ -2813,7 +2818,7 @@
           <a:p>
             <a:fld id="{0C89B91E-DD4E-4589-B9A0-BBCC79F14B9B}" type="datetimeFigureOut">
               <a:rPr lang="en-US" smtClean="0"/>
-              <a:t>12/2/2019</a:t>
+              <a:t>12/3/2019</a:t>
             </a:fld>
             <a:endParaRPr lang="en-US"/>
           </a:p>
@@ -2983,7 +2988,7 @@
           <a:p>
             <a:fld id="{0C89B91E-DD4E-4589-B9A0-BBCC79F14B9B}" type="datetimeFigureOut">
               <a:rPr lang="en-US" smtClean="0"/>
-              <a:t>12/2/2019</a:t>
+              <a:t>12/3/2019</a:t>
             </a:fld>
             <a:endParaRPr lang="en-US"/>
           </a:p>
@@ -3230,7 +3235,7 @@
           <a:p>
             <a:fld id="{0C89B91E-DD4E-4589-B9A0-BBCC79F14B9B}" type="datetimeFigureOut">
               <a:rPr lang="en-US" smtClean="0"/>
-              <a:t>12/2/2019</a:t>
+              <a:t>12/3/2019</a:t>
             </a:fld>
             <a:endParaRPr lang="en-US"/>
           </a:p>
@@ -3462,7 +3467,7 @@
           <a:p>
             <a:fld id="{0C89B91E-DD4E-4589-B9A0-BBCC79F14B9B}" type="datetimeFigureOut">
               <a:rPr lang="en-US" smtClean="0"/>
-              <a:t>12/2/2019</a:t>
+              <a:t>12/3/2019</a:t>
             </a:fld>
             <a:endParaRPr lang="en-US"/>
           </a:p>
@@ -3836,7 +3841,7 @@
           <a:p>
             <a:fld id="{0C89B91E-DD4E-4589-B9A0-BBCC79F14B9B}" type="datetimeFigureOut">
               <a:rPr lang="en-US" smtClean="0"/>
-              <a:t>12/2/2019</a:t>
+              <a:t>12/3/2019</a:t>
             </a:fld>
             <a:endParaRPr lang="en-US"/>
           </a:p>
@@ -3959,7 +3964,7 @@
           <a:p>
             <a:fld id="{0C89B91E-DD4E-4589-B9A0-BBCC79F14B9B}" type="datetimeFigureOut">
               <a:rPr lang="en-US" smtClean="0"/>
-              <a:t>12/2/2019</a:t>
+              <a:t>12/3/2019</a:t>
             </a:fld>
             <a:endParaRPr lang="en-US"/>
           </a:p>
@@ -4054,7 +4059,7 @@
           <a:p>
             <a:fld id="{0C89B91E-DD4E-4589-B9A0-BBCC79F14B9B}" type="datetimeFigureOut">
               <a:rPr lang="en-US" smtClean="0"/>
-              <a:t>12/2/2019</a:t>
+              <a:t>12/3/2019</a:t>
             </a:fld>
             <a:endParaRPr lang="en-US"/>
           </a:p>
@@ -4309,7 +4314,7 @@
           <a:p>
             <a:fld id="{0C89B91E-DD4E-4589-B9A0-BBCC79F14B9B}" type="datetimeFigureOut">
               <a:rPr lang="en-US" smtClean="0"/>
-              <a:t>12/2/2019</a:t>
+              <a:t>12/3/2019</a:t>
             </a:fld>
             <a:endParaRPr lang="en-US"/>
           </a:p>
@@ -4614,7 +4619,7 @@
           <a:p>
             <a:fld id="{0C89B91E-DD4E-4589-B9A0-BBCC79F14B9B}" type="datetimeFigureOut">
               <a:rPr lang="en-US" smtClean="0"/>
-              <a:t>12/2/2019</a:t>
+              <a:t>12/3/2019</a:t>
             </a:fld>
             <a:endParaRPr lang="en-US"/>
           </a:p>
@@ -5316,7 +5321,7 @@
           <a:p>
             <a:fld id="{0C89B91E-DD4E-4589-B9A0-BBCC79F14B9B}" type="datetimeFigureOut">
               <a:rPr lang="en-US" smtClean="0"/>
-              <a:t>12/2/2019</a:t>
+              <a:t>12/3/2019</a:t>
             </a:fld>
             <a:endParaRPr lang="en-US"/>
           </a:p>
@@ -5949,6 +5954,136 @@
           <a:p>
             <a:r>
               <a:rPr lang="en-US" dirty="0"/>
+              <a:t>Guidelines</a:t>
+            </a:r>
+          </a:p>
+        </p:txBody>
+      </p:sp>
+      <p:sp>
+        <p:nvSpPr>
+          <p:cNvPr id="3" name="Content Placeholder 2">
+            <a:extLst>
+              <a:ext uri="{FF2B5EF4-FFF2-40B4-BE49-F238E27FC236}">
+                <a16:creationId xmlns:a16="http://schemas.microsoft.com/office/drawing/2014/main" id="{42FF1B1D-01AB-469C-A31E-734A5043938D}"/>
+              </a:ext>
+            </a:extLst>
+          </p:cNvPr>
+          <p:cNvSpPr>
+            <a:spLocks noGrp="1"/>
+          </p:cNvSpPr>
+          <p:nvPr>
+            <p:ph idx="1"/>
+          </p:nvPr>
+        </p:nvSpPr>
+        <p:spPr/>
+        <p:txBody>
+          <a:bodyPr/>
+          <a:lstStyle/>
+          <a:p>
+            <a:r>
+              <a:rPr lang="en-US" dirty="0"/>
+              <a:t>Single focus pages</a:t>
+            </a:r>
+          </a:p>
+          <a:p>
+            <a:r>
+              <a:rPr lang="en-US" dirty="0"/>
+              <a:t>Simple layout and colors</a:t>
+            </a:r>
+          </a:p>
+          <a:p>
+            <a:r>
+              <a:rPr lang="en-US" dirty="0"/>
+              <a:t>Explicit intent</a:t>
+            </a:r>
+          </a:p>
+          <a:p>
+            <a:r>
+              <a:rPr lang="en-US" dirty="0"/>
+              <a:t>Icons paired with text</a:t>
+            </a:r>
+          </a:p>
+          <a:p>
+            <a:r>
+              <a:rPr lang="en-US" dirty="0"/>
+              <a:t>Text</a:t>
+            </a:r>
+          </a:p>
+          <a:p>
+            <a:pPr lvl="1"/>
+            <a:r>
+              <a:rPr lang="en-US" dirty="0"/>
+              <a:t>At least 16px font</a:t>
+            </a:r>
+          </a:p>
+          <a:p>
+            <a:pPr lvl="1"/>
+            <a:r>
+              <a:rPr lang="en-US" dirty="0"/>
+              <a:t>Sans-serif Arial, Helvetica</a:t>
+            </a:r>
+          </a:p>
+          <a:p>
+            <a:r>
+              <a:rPr lang="en-US" dirty="0"/>
+              <a:t>Contrasting color scheme to help with color blindness</a:t>
+            </a:r>
+          </a:p>
+        </p:txBody>
+      </p:sp>
+    </p:spTree>
+    <p:extLst>
+      <p:ext uri="{BB962C8B-B14F-4D97-AF65-F5344CB8AC3E}">
+        <p14:creationId xmlns:p14="http://schemas.microsoft.com/office/powerpoint/2010/main" val="193929513"/>
+      </p:ext>
+    </p:extLst>
+  </p:cSld>
+  <p:clrMapOvr>
+    <a:masterClrMapping/>
+  </p:clrMapOvr>
+</p:sld>
+</file>
+
+<file path=ppt/slides/slide3.xml><?xml version="1.0" encoding="utf-8"?>
+<p:sld xmlns:a="http://schemas.openxmlformats.org/drawingml/2006/main" xmlns:r="http://schemas.openxmlformats.org/officeDocument/2006/relationships" xmlns:p="http://schemas.openxmlformats.org/presentationml/2006/main">
+  <p:cSld>
+    <p:spTree>
+      <p:nvGrpSpPr>
+        <p:cNvPr id="1" name=""/>
+        <p:cNvGrpSpPr/>
+        <p:nvPr/>
+      </p:nvGrpSpPr>
+      <p:grpSpPr>
+        <a:xfrm>
+          <a:off x="0" y="0"/>
+          <a:ext cx="0" cy="0"/>
+          <a:chOff x="0" y="0"/>
+          <a:chExt cx="0" cy="0"/>
+        </a:xfrm>
+      </p:grpSpPr>
+      <p:sp>
+        <p:nvSpPr>
+          <p:cNvPr id="2" name="Title 1">
+            <a:extLst>
+              <a:ext uri="{FF2B5EF4-FFF2-40B4-BE49-F238E27FC236}">
+                <a16:creationId xmlns:a16="http://schemas.microsoft.com/office/drawing/2014/main" id="{82943259-5078-4EBE-9080-20E3E09C870A}"/>
+              </a:ext>
+            </a:extLst>
+          </p:cNvPr>
+          <p:cNvSpPr>
+            <a:spLocks noGrp="1"/>
+          </p:cNvSpPr>
+          <p:nvPr>
+            <p:ph type="title"/>
+          </p:nvPr>
+        </p:nvSpPr>
+        <p:spPr/>
+        <p:txBody>
+          <a:bodyPr/>
+          <a:lstStyle/>
+          <a:p>
+            <a:r>
+              <a:rPr lang="en-US" dirty="0"/>
               <a:t>Design</a:t>
             </a:r>
           </a:p>
@@ -5997,7 +6132,7 @@
 </p:sld>
 </file>
 
-<file path=ppt/slides/slide3.xml><?xml version="1.0" encoding="utf-8"?>
+<file path=ppt/slides/slide4.xml><?xml version="1.0" encoding="utf-8"?>
 <p:sld xmlns:a="http://schemas.openxmlformats.org/drawingml/2006/main" xmlns:r="http://schemas.openxmlformats.org/officeDocument/2006/relationships" xmlns:p="http://schemas.openxmlformats.org/presentationml/2006/main">
   <p:cSld>
     <p:spTree>
@@ -6085,7 +6220,7 @@
 </p:sld>
 </file>
 
-<file path=ppt/slides/slide4.xml><?xml version="1.0" encoding="utf-8"?>
+<file path=ppt/slides/slide5.xml><?xml version="1.0" encoding="utf-8"?>
 <p:sld xmlns:a="http://schemas.openxmlformats.org/drawingml/2006/main" xmlns:r="http://schemas.openxmlformats.org/officeDocument/2006/relationships" xmlns:p="http://schemas.openxmlformats.org/presentationml/2006/main">
   <p:cSld>
     <p:spTree>
@@ -6173,7 +6308,7 @@
 </p:sld>
 </file>
 
-<file path=ppt/slides/slide5.xml><?xml version="1.0" encoding="utf-8"?>
+<file path=ppt/slides/slide6.xml><?xml version="1.0" encoding="utf-8"?>
 <p:sld xmlns:a="http://schemas.openxmlformats.org/drawingml/2006/main" xmlns:r="http://schemas.openxmlformats.org/officeDocument/2006/relationships" xmlns:p="http://schemas.openxmlformats.org/presentationml/2006/main">
   <p:cSld>
     <p:spTree>
@@ -6261,136 +6396,6 @@
 </p:sld>
 </file>
 
-<file path=ppt/slides/slide6.xml><?xml version="1.0" encoding="utf-8"?>
-<p:sld xmlns:a="http://schemas.openxmlformats.org/drawingml/2006/main" xmlns:r="http://schemas.openxmlformats.org/officeDocument/2006/relationships" xmlns:p="http://schemas.openxmlformats.org/presentationml/2006/main">
-  <p:cSld>
-    <p:spTree>
-      <p:nvGrpSpPr>
-        <p:cNvPr id="1" name=""/>
-        <p:cNvGrpSpPr/>
-        <p:nvPr/>
-      </p:nvGrpSpPr>
-      <p:grpSpPr>
-        <a:xfrm>
-          <a:off x="0" y="0"/>
-          <a:ext cx="0" cy="0"/>
-          <a:chOff x="0" y="0"/>
-          <a:chExt cx="0" cy="0"/>
-        </a:xfrm>
-      </p:grpSpPr>
-      <p:sp>
-        <p:nvSpPr>
-          <p:cNvPr id="2" name="Title 1">
-            <a:extLst>
-              <a:ext uri="{FF2B5EF4-FFF2-40B4-BE49-F238E27FC236}">
-                <a16:creationId xmlns:a16="http://schemas.microsoft.com/office/drawing/2014/main" id="{82943259-5078-4EBE-9080-20E3E09C870A}"/>
-              </a:ext>
-            </a:extLst>
-          </p:cNvPr>
-          <p:cNvSpPr>
-            <a:spLocks noGrp="1"/>
-          </p:cNvSpPr>
-          <p:nvPr>
-            <p:ph type="title"/>
-          </p:nvPr>
-        </p:nvSpPr>
-        <p:spPr/>
-        <p:txBody>
-          <a:bodyPr/>
-          <a:lstStyle/>
-          <a:p>
-            <a:r>
-              <a:rPr lang="en-US" dirty="0"/>
-              <a:t>Guidelines</a:t>
-            </a:r>
-          </a:p>
-        </p:txBody>
-      </p:sp>
-      <p:sp>
-        <p:nvSpPr>
-          <p:cNvPr id="3" name="Content Placeholder 2">
-            <a:extLst>
-              <a:ext uri="{FF2B5EF4-FFF2-40B4-BE49-F238E27FC236}">
-                <a16:creationId xmlns:a16="http://schemas.microsoft.com/office/drawing/2014/main" id="{42FF1B1D-01AB-469C-A31E-734A5043938D}"/>
-              </a:ext>
-            </a:extLst>
-          </p:cNvPr>
-          <p:cNvSpPr>
-            <a:spLocks noGrp="1"/>
-          </p:cNvSpPr>
-          <p:nvPr>
-            <p:ph idx="1"/>
-          </p:nvPr>
-        </p:nvSpPr>
-        <p:spPr/>
-        <p:txBody>
-          <a:bodyPr/>
-          <a:lstStyle/>
-          <a:p>
-            <a:r>
-              <a:rPr lang="en-US" dirty="0"/>
-              <a:t>Single focus pages</a:t>
-            </a:r>
-          </a:p>
-          <a:p>
-            <a:r>
-              <a:rPr lang="en-US" dirty="0"/>
-              <a:t>Simple layout and colors</a:t>
-            </a:r>
-          </a:p>
-          <a:p>
-            <a:r>
-              <a:rPr lang="en-US" dirty="0"/>
-              <a:t>Explicit intent</a:t>
-            </a:r>
-          </a:p>
-          <a:p>
-            <a:r>
-              <a:rPr lang="en-US" dirty="0"/>
-              <a:t>Icons paired with text</a:t>
-            </a:r>
-          </a:p>
-          <a:p>
-            <a:r>
-              <a:rPr lang="en-US" dirty="0"/>
-              <a:t>Text</a:t>
-            </a:r>
-          </a:p>
-          <a:p>
-            <a:pPr lvl="1"/>
-            <a:r>
-              <a:rPr lang="en-US" dirty="0"/>
-              <a:t>At least 16px font</a:t>
-            </a:r>
-          </a:p>
-          <a:p>
-            <a:pPr lvl="1"/>
-            <a:r>
-              <a:rPr lang="en-US" dirty="0"/>
-              <a:t>Sans-serif Arial, Helvetica</a:t>
-            </a:r>
-          </a:p>
-          <a:p>
-            <a:r>
-              <a:rPr lang="en-US" dirty="0"/>
-              <a:t>Contrasting color scheme to help with color blindness</a:t>
-            </a:r>
-          </a:p>
-        </p:txBody>
-      </p:sp>
-    </p:spTree>
-    <p:extLst>
-      <p:ext uri="{BB962C8B-B14F-4D97-AF65-F5344CB8AC3E}">
-        <p14:creationId xmlns:p14="http://schemas.microsoft.com/office/powerpoint/2010/main" val="193929513"/>
-      </p:ext>
-    </p:extLst>
-  </p:cSld>
-  <p:clrMapOvr>
-    <a:masterClrMapping/>
-  </p:clrMapOvr>
-</p:sld>
-</file>
-
 <file path=ppt/slides/slide7.xml><?xml version="1.0" encoding="utf-8"?>
 <p:sld xmlns:a="http://schemas.openxmlformats.org/drawingml/2006/main" xmlns:r="http://schemas.openxmlformats.org/officeDocument/2006/relationships" xmlns:p="http://schemas.openxmlformats.org/presentationml/2006/main">
   <p:cSld>
@@ -6486,6 +6491,12 @@
             <a:r>
               <a:rPr lang="en-US" dirty="0"/>
               <a:t>Add tutorial on first visit</a:t>
+            </a:r>
+          </a:p>
+          <a:p>
+            <a:r>
+              <a:rPr lang="en-US" dirty="0"/>
+              <a:t>Add logging for usage statistics</a:t>
             </a:r>
           </a:p>
         </p:txBody>

</xml_diff>